<commit_message>
adjust scripts to make it easier
</commit_message>
<xml_diff>
--- a/Lessons/I_ConsumerCredit_NonTraditionalInvesting/ConsumerCredit_NonTraditionalMkts.pptx
+++ b/Lessons/I_ConsumerCredit_NonTraditionalInvesting/ConsumerCredit_NonTraditionalMkts.pptx
@@ -16,9 +16,9 @@
     <p:sldId id="413" r:id="rId7"/>
     <p:sldId id="415" r:id="rId8"/>
     <p:sldId id="416" r:id="rId9"/>
-    <p:sldId id="417" r:id="rId10"/>
-    <p:sldId id="511" r:id="rId11"/>
-    <p:sldId id="420" r:id="rId12"/>
+    <p:sldId id="420" r:id="rId10"/>
+    <p:sldId id="417" r:id="rId11"/>
+    <p:sldId id="511" r:id="rId12"/>
     <p:sldId id="446" r:id="rId13"/>
     <p:sldId id="512" r:id="rId14"/>
     <p:sldId id="517" r:id="rId15"/>
@@ -235,7 +235,7 @@
           <a:p>
             <a:fld id="{B0C0A60C-850A-4EA4-9C14-A8FE98B94505}" type="datetimeFigureOut">
               <a:rPr lang="en-US" smtClean="0"/>
-              <a:t>11/22/21</a:t>
+              <a:t>4/4/22</a:t>
             </a:fld>
             <a:endParaRPr lang="en-US"/>
           </a:p>
@@ -732,7 +732,7 @@
           <a:p>
             <a:fld id="{5738B90E-0779-4C36-915C-6F05FCD89456}" type="datetime1">
               <a:rPr lang="en-US" smtClean="0"/>
-              <a:t>11/22/21</a:t>
+              <a:t>4/4/22</a:t>
             </a:fld>
             <a:endParaRPr lang="en-US"/>
           </a:p>
@@ -950,7 +950,7 @@
           <a:p>
             <a:fld id="{7B9EA29D-D431-42FE-B7B6-AAE4454C77D3}" type="datetime1">
               <a:rPr lang="en-US" smtClean="0"/>
-              <a:t>11/22/21</a:t>
+              <a:t>4/4/22</a:t>
             </a:fld>
             <a:endParaRPr lang="en-US"/>
           </a:p>
@@ -1210,7 +1210,7 @@
           <a:p>
             <a:fld id="{690D8A1E-EA8F-46C1-B891-AE0C00D9C314}" type="datetime1">
               <a:rPr lang="en-US" smtClean="0"/>
-              <a:t>11/22/21</a:t>
+              <a:t>4/4/22</a:t>
             </a:fld>
             <a:endParaRPr lang="en-US"/>
           </a:p>
@@ -1726,7 +1726,7 @@
           <a:p>
             <a:fld id="{DAB365D0-5BFF-4591-B84D-8953AC9A16AD}" type="datetime1">
               <a:rPr lang="en-US" smtClean="0"/>
-              <a:t>11/22/21</a:t>
+              <a:t>4/4/22</a:t>
             </a:fld>
             <a:endParaRPr lang="en-US" dirty="0"/>
           </a:p>
@@ -1960,7 +1960,7 @@
           <a:p>
             <a:fld id="{D753EFC8-4232-4598-94F6-94C0EBAFC469}" type="datetime1">
               <a:rPr lang="en-US" smtClean="0"/>
-              <a:t>11/22/21</a:t>
+              <a:t>4/4/22</a:t>
             </a:fld>
             <a:endParaRPr lang="en-US"/>
           </a:p>
@@ -2275,7 +2275,7 @@
           <a:p>
             <a:fld id="{F3161074-1C18-4AE7-957D-F18524378C85}" type="datetime1">
               <a:rPr lang="en-US" smtClean="0"/>
-              <a:t>11/22/21</a:t>
+              <a:t>4/4/22</a:t>
             </a:fld>
             <a:endParaRPr lang="en-US"/>
           </a:p>
@@ -2549,7 +2549,7 @@
           <a:p>
             <a:fld id="{69BE256C-8D9A-4404-B47D-41A1AE514425}" type="datetime1">
               <a:rPr lang="en-US" smtClean="0"/>
-              <a:t>11/22/21</a:t>
+              <a:t>4/4/22</a:t>
             </a:fld>
             <a:endParaRPr lang="en-US"/>
           </a:p>
@@ -2983,7 +2983,7 @@
           <a:p>
             <a:fld id="{66CB2154-9035-4012-8189-BAAB61C5A5EE}" type="datetime1">
               <a:rPr lang="en-US" smtClean="0"/>
-              <a:t>11/22/21</a:t>
+              <a:t>4/4/22</a:t>
             </a:fld>
             <a:endParaRPr lang="en-US"/>
           </a:p>
@@ -3157,7 +3157,7 @@
           <a:p>
             <a:fld id="{6700A58B-DD98-43D0-B791-721480A02982}" type="datetime1">
               <a:rPr lang="en-US" smtClean="0"/>
-              <a:t>11/22/21</a:t>
+              <a:t>4/4/22</a:t>
             </a:fld>
             <a:endParaRPr lang="en-US"/>
           </a:p>
@@ -3349,7 +3349,7 @@
           <a:p>
             <a:fld id="{7DB6E382-4F61-4E24-BE1A-377EC83D0E3A}" type="datetime1">
               <a:rPr lang="en-US" smtClean="0"/>
-              <a:t>11/22/21</a:t>
+              <a:t>4/4/22</a:t>
             </a:fld>
             <a:endParaRPr lang="en-US"/>
           </a:p>
@@ -3660,7 +3660,7 @@
           <a:p>
             <a:fld id="{4142EED6-FC16-45B9-B8C4-2BC5DBA88325}" type="datetime1">
               <a:rPr lang="en-US" smtClean="0"/>
-              <a:t>11/22/21</a:t>
+              <a:t>4/4/22</a:t>
             </a:fld>
             <a:endParaRPr lang="en-US"/>
           </a:p>
@@ -3978,7 +3978,7 @@
           <a:p>
             <a:fld id="{DF59512B-4F1D-43D7-8819-2F53FEF69650}" type="datetime1">
               <a:rPr lang="en-US" smtClean="0"/>
-              <a:t>11/22/21</a:t>
+              <a:t>4/4/22</a:t>
             </a:fld>
             <a:endParaRPr lang="en-US"/>
           </a:p>
@@ -4254,7 +4254,7 @@
           <a:p>
             <a:fld id="{08437B94-E2BF-44DC-ADC5-B05FC9934E9D}" type="datetime1">
               <a:rPr lang="en-US" smtClean="0"/>
-              <a:t>11/22/21</a:t>
+              <a:t>4/4/22</a:t>
             </a:fld>
             <a:endParaRPr lang="en-US"/>
           </a:p>
@@ -4794,7 +4794,7 @@
           <a:p>
             <a:fld id="{5738B90E-0779-4C36-915C-6F05FCD89456}" type="datetime1">
               <a:rPr lang="en-US" smtClean="0"/>
-              <a:t>11/22/21</a:t>
+              <a:t>4/4/22</a:t>
             </a:fld>
             <a:endParaRPr lang="en-US"/>
           </a:p>
@@ -4871,6 +4871,190 @@
 </file>
 
 <file path=ppt/slides/slide10.xml><?xml version="1.0" encoding="utf-8"?>
+<p:sld xmlns:a="http://schemas.openxmlformats.org/drawingml/2006/main" xmlns:r="http://schemas.openxmlformats.org/officeDocument/2006/relationships" xmlns:p="http://schemas.openxmlformats.org/presentationml/2006/main">
+  <p:cSld>
+    <p:spTree>
+      <p:nvGrpSpPr>
+        <p:cNvPr id="1" name=""/>
+        <p:cNvGrpSpPr/>
+        <p:nvPr/>
+      </p:nvGrpSpPr>
+      <p:grpSpPr>
+        <a:xfrm>
+          <a:off x="0" y="0"/>
+          <a:ext cx="0" cy="0"/>
+          <a:chOff x="0" y="0"/>
+          <a:chExt cx="0" cy="0"/>
+        </a:xfrm>
+      </p:grpSpPr>
+      <p:sp>
+        <p:nvSpPr>
+          <p:cNvPr id="3" name="Title 2"/>
+          <p:cNvSpPr>
+            <a:spLocks noGrp="1"/>
+          </p:cNvSpPr>
+          <p:nvPr>
+            <p:ph type="title"/>
+          </p:nvPr>
+        </p:nvSpPr>
+        <p:spPr/>
+        <p:txBody>
+          <a:bodyPr>
+            <a:normAutofit/>
+          </a:bodyPr>
+          <a:lstStyle/>
+          <a:p>
+            <a:r>
+              <a:rPr lang="en-US" dirty="0"/>
+              <a:t>Open </a:t>
+            </a:r>
+            <a:r>
+              <a:rPr lang="en-US" dirty="0" err="1"/>
+              <a:t>A_ConsumerCreditTraining.R</a:t>
+            </a:r>
+            <a:endParaRPr lang="en-US" dirty="0"/>
+          </a:p>
+        </p:txBody>
+      </p:sp>
+      <p:sp>
+        <p:nvSpPr>
+          <p:cNvPr id="2" name="Date Placeholder 1"/>
+          <p:cNvSpPr>
+            <a:spLocks noGrp="1"/>
+          </p:cNvSpPr>
+          <p:nvPr>
+            <p:ph type="dt" sz="half" idx="10"/>
+          </p:nvPr>
+        </p:nvSpPr>
+        <p:spPr/>
+        <p:txBody>
+          <a:bodyPr/>
+          <a:lstStyle/>
+          <a:p>
+            <a:fld id="{6700A58B-DD98-43D0-B791-721480A02982}" type="datetime1">
+              <a:rPr lang="en-US" smtClean="0"/>
+              <a:t>4/4/22</a:t>
+            </a:fld>
+            <a:endParaRPr lang="en-US"/>
+          </a:p>
+        </p:txBody>
+      </p:sp>
+      <p:sp>
+        <p:nvSpPr>
+          <p:cNvPr id="7" name="TextBox 6"/>
+          <p:cNvSpPr txBox="1"/>
+          <p:nvPr/>
+        </p:nvSpPr>
+        <p:spPr>
+          <a:xfrm>
+            <a:off x="1671638" y="2100265"/>
+            <a:ext cx="4005712" cy="1246495"/>
+          </a:xfrm>
+          <a:prstGeom prst="rect">
+            <a:avLst/>
+          </a:prstGeom>
+          <a:noFill/>
+        </p:spPr>
+        <p:txBody>
+          <a:bodyPr wrap="none" rtlCol="0">
+            <a:spAutoFit/>
+          </a:bodyPr>
+          <a:lstStyle/>
+          <a:p>
+            <a:r>
+              <a:rPr lang="en-US" sz="2100" u="sng" dirty="0"/>
+              <a:t>Learning Objective:</a:t>
+            </a:r>
+          </a:p>
+          <a:p>
+            <a:pPr marL="214313" indent="-214313">
+              <a:buFont typeface="Arial" panose="020B0604020202020204" pitchFamily="34" charset="0"/>
+              <a:buChar char="•"/>
+            </a:pPr>
+            <a:r>
+              <a:rPr lang="en-US" sz="1350" dirty="0"/>
+              <a:t>Load in real lending club data</a:t>
+            </a:r>
+          </a:p>
+          <a:p>
+            <a:pPr marL="214313" indent="-214313">
+              <a:buFont typeface="Arial" panose="020B0604020202020204" pitchFamily="34" charset="0"/>
+              <a:buChar char="•"/>
+            </a:pPr>
+            <a:r>
+              <a:rPr lang="en-US" sz="1350" dirty="0"/>
+              <a:t>Treat the variables for modeling</a:t>
+            </a:r>
+          </a:p>
+          <a:p>
+            <a:pPr marL="214313" indent="-214313">
+              <a:buFont typeface="Arial" panose="020B0604020202020204" pitchFamily="34" charset="0"/>
+              <a:buChar char="•"/>
+            </a:pPr>
+            <a:r>
+              <a:rPr lang="en-US" sz="1350" dirty="0"/>
+              <a:t>Build a cross validated logistic regression with caret</a:t>
+            </a:r>
+          </a:p>
+          <a:p>
+            <a:pPr marL="214313" indent="-214313">
+              <a:buFont typeface="Arial" panose="020B0604020202020204" pitchFamily="34" charset="0"/>
+              <a:buChar char="•"/>
+            </a:pPr>
+            <a:r>
+              <a:rPr lang="en-US" sz="1350" dirty="0"/>
+              <a:t>Save model object &amp; variable treatment plan</a:t>
+            </a:r>
+          </a:p>
+        </p:txBody>
+      </p:sp>
+      <p:sp>
+        <p:nvSpPr>
+          <p:cNvPr id="9" name="Footer Placeholder 5">
+            <a:extLst>
+              <a:ext uri="{FF2B5EF4-FFF2-40B4-BE49-F238E27FC236}">
+                <a16:creationId xmlns:a16="http://schemas.microsoft.com/office/drawing/2014/main" id="{9277C6F8-4983-274A-964F-2EF190F05F15}"/>
+              </a:ext>
+            </a:extLst>
+          </p:cNvPr>
+          <p:cNvSpPr>
+            <a:spLocks noGrp="1"/>
+          </p:cNvSpPr>
+          <p:nvPr>
+            <p:ph type="ftr" sz="quarter" idx="3"/>
+          </p:nvPr>
+        </p:nvSpPr>
+        <p:spPr>
+          <a:xfrm>
+            <a:off x="3028950" y="6356353"/>
+            <a:ext cx="3086100" cy="365125"/>
+          </a:xfrm>
+        </p:spPr>
+        <p:txBody>
+          <a:bodyPr/>
+          <a:lstStyle/>
+          <a:p>
+            <a:r>
+              <a:rPr lang="en-US" dirty="0"/>
+              <a:t>Kwartler CSCI 96</a:t>
+            </a:r>
+          </a:p>
+        </p:txBody>
+      </p:sp>
+    </p:spTree>
+    <p:extLst>
+      <p:ext uri="{BB962C8B-B14F-4D97-AF65-F5344CB8AC3E}">
+        <p14:creationId xmlns:p14="http://schemas.microsoft.com/office/powerpoint/2010/main" val="1623617834"/>
+      </p:ext>
+    </p:extLst>
+  </p:cSld>
+  <p:clrMapOvr>
+    <a:masterClrMapping/>
+  </p:clrMapOvr>
+</p:sld>
+</file>
+
+<file path=ppt/slides/slide11.xml><?xml version="1.0" encoding="utf-8"?>
 <p:sld xmlns:a="http://schemas.openxmlformats.org/drawingml/2006/main" xmlns:r="http://schemas.openxmlformats.org/officeDocument/2006/relationships" xmlns:p="http://schemas.openxmlformats.org/presentationml/2006/main">
   <p:cSld>
     <p:spTree>
@@ -5225,7 +5409,7 @@
           <a:p>
             <a:fld id="{9B19E99B-5349-415A-8E56-8E989211A366}" type="datetime1">
               <a:rPr lang="en-US" smtClean="0"/>
-              <a:t>11/22/21</a:t>
+              <a:t>4/4/22</a:t>
             </a:fld>
             <a:endParaRPr lang="en-US"/>
           </a:p>
@@ -5268,216 +5452,6 @@
     <p:extLst>
       <p:ext uri="{BB962C8B-B14F-4D97-AF65-F5344CB8AC3E}">
         <p14:creationId xmlns:p14="http://schemas.microsoft.com/office/powerpoint/2010/main" val="2747930621"/>
-      </p:ext>
-    </p:extLst>
-  </p:cSld>
-  <p:clrMapOvr>
-    <a:masterClrMapping/>
-  </p:clrMapOvr>
-</p:sld>
-</file>
-
-<file path=ppt/slides/slide11.xml><?xml version="1.0" encoding="utf-8"?>
-<p:sld xmlns:a="http://schemas.openxmlformats.org/drawingml/2006/main" xmlns:r="http://schemas.openxmlformats.org/officeDocument/2006/relationships" xmlns:p="http://schemas.openxmlformats.org/presentationml/2006/main">
-  <p:cSld>
-    <p:spTree>
-      <p:nvGrpSpPr>
-        <p:cNvPr id="1" name=""/>
-        <p:cNvGrpSpPr/>
-        <p:nvPr/>
-      </p:nvGrpSpPr>
-      <p:grpSpPr>
-        <a:xfrm>
-          <a:off x="0" y="0"/>
-          <a:ext cx="0" cy="0"/>
-          <a:chOff x="0" y="0"/>
-          <a:chExt cx="0" cy="0"/>
-        </a:xfrm>
-      </p:grpSpPr>
-      <p:sp>
-        <p:nvSpPr>
-          <p:cNvPr id="3" name="Title 2"/>
-          <p:cNvSpPr>
-            <a:spLocks noGrp="1"/>
-          </p:cNvSpPr>
-          <p:nvPr>
-            <p:ph type="title"/>
-          </p:nvPr>
-        </p:nvSpPr>
-        <p:spPr/>
-        <p:txBody>
-          <a:bodyPr>
-            <a:normAutofit/>
-          </a:bodyPr>
-          <a:lstStyle/>
-          <a:p>
-            <a:r>
-              <a:rPr lang="en-US" dirty="0"/>
-              <a:t>Cutoff Threshold</a:t>
-            </a:r>
-          </a:p>
-        </p:txBody>
-      </p:sp>
-      <p:sp>
-        <p:nvSpPr>
-          <p:cNvPr id="2" name="Date Placeholder 1"/>
-          <p:cNvSpPr>
-            <a:spLocks noGrp="1"/>
-          </p:cNvSpPr>
-          <p:nvPr>
-            <p:ph type="dt" sz="half" idx="10"/>
-          </p:nvPr>
-        </p:nvSpPr>
-        <p:spPr/>
-        <p:txBody>
-          <a:bodyPr/>
-          <a:lstStyle/>
-          <a:p>
-            <a:fld id="{6700A58B-DD98-43D0-B791-721480A02982}" type="datetime1">
-              <a:rPr lang="en-US" smtClean="0"/>
-              <a:t>11/22/21</a:t>
-            </a:fld>
-            <a:endParaRPr lang="en-US"/>
-          </a:p>
-        </p:txBody>
-      </p:sp>
-      <p:sp>
-        <p:nvSpPr>
-          <p:cNvPr id="6" name="TextBox 5"/>
-          <p:cNvSpPr txBox="1"/>
-          <p:nvPr/>
-        </p:nvSpPr>
-        <p:spPr>
-          <a:xfrm>
-            <a:off x="658816" y="3071213"/>
-            <a:ext cx="7872155" cy="1061829"/>
-          </a:xfrm>
-          <a:prstGeom prst="rect">
-            <a:avLst/>
-          </a:prstGeom>
-          <a:noFill/>
-        </p:spPr>
-        <p:txBody>
-          <a:bodyPr wrap="none" rtlCol="0">
-            <a:spAutoFit/>
-          </a:bodyPr>
-          <a:lstStyle/>
-          <a:p>
-            <a:pPr marL="82154" indent="-82154">
-              <a:buFont typeface="Arial" panose="020B0604020202020204" pitchFamily="34" charset="0"/>
-              <a:buChar char="•"/>
-            </a:pPr>
-            <a:r>
-              <a:rPr lang="en-US" sz="2100" dirty="0"/>
-              <a:t>Should we be equal weighted?  </a:t>
-            </a:r>
-          </a:p>
-          <a:p>
-            <a:pPr marL="82154" indent="-82154">
-              <a:buFont typeface="Arial" panose="020B0604020202020204" pitchFamily="34" charset="0"/>
-              <a:buChar char="•"/>
-            </a:pPr>
-            <a:endParaRPr lang="en-US" sz="2100" dirty="0"/>
-          </a:p>
-          <a:p>
-            <a:pPr marL="82154" indent="-82154">
-              <a:buFont typeface="Arial" panose="020B0604020202020204" pitchFamily="34" charset="0"/>
-              <a:buChar char="•"/>
-            </a:pPr>
-            <a:r>
-              <a:rPr lang="en-US" sz="2100" dirty="0"/>
-              <a:t>Do we care </a:t>
-            </a:r>
-            <a:r>
-              <a:rPr lang="en-US" sz="2100" u="sng" dirty="0"/>
-              <a:t>equally</a:t>
-            </a:r>
-            <a:r>
-              <a:rPr lang="en-US" sz="2100" dirty="0"/>
-              <a:t> about picking paying notes and charged off loans?</a:t>
-            </a:r>
-          </a:p>
-        </p:txBody>
-      </p:sp>
-      <p:sp>
-        <p:nvSpPr>
-          <p:cNvPr id="9" name="TextBox 8">
-            <a:extLst>
-              <a:ext uri="{FF2B5EF4-FFF2-40B4-BE49-F238E27FC236}">
-                <a16:creationId xmlns:a16="http://schemas.microsoft.com/office/drawing/2014/main" id="{6F8E5C01-2AE6-489C-BED6-17BC74CB7B2E}"/>
-              </a:ext>
-            </a:extLst>
-          </p:cNvPr>
-          <p:cNvSpPr txBox="1"/>
-          <p:nvPr/>
-        </p:nvSpPr>
-        <p:spPr>
-          <a:xfrm>
-            <a:off x="150185" y="1832368"/>
-            <a:ext cx="8843630" cy="300082"/>
-          </a:xfrm>
-          <a:prstGeom prst="rect">
-            <a:avLst/>
-          </a:prstGeom>
-          <a:solidFill>
-            <a:schemeClr val="accent2"/>
-          </a:solidFill>
-        </p:spPr>
-        <p:txBody>
-          <a:bodyPr wrap="square" rtlCol="0">
-            <a:spAutoFit/>
-          </a:bodyPr>
-          <a:lstStyle/>
-          <a:p>
-            <a:pPr algn="ctr"/>
-            <a:r>
-              <a:rPr lang="en-US" sz="1350" dirty="0">
-                <a:solidFill>
-                  <a:schemeClr val="bg1"/>
-                </a:solidFill>
-              </a:rPr>
-              <a:t>Is 0.50 the optimal cutoff?</a:t>
-            </a:r>
-          </a:p>
-        </p:txBody>
-      </p:sp>
-      <p:sp>
-        <p:nvSpPr>
-          <p:cNvPr id="10" name="Footer Placeholder 5">
-            <a:extLst>
-              <a:ext uri="{FF2B5EF4-FFF2-40B4-BE49-F238E27FC236}">
-                <a16:creationId xmlns:a16="http://schemas.microsoft.com/office/drawing/2014/main" id="{F4436ACB-9FF7-F648-8297-D3665261015D}"/>
-              </a:ext>
-            </a:extLst>
-          </p:cNvPr>
-          <p:cNvSpPr>
-            <a:spLocks noGrp="1"/>
-          </p:cNvSpPr>
-          <p:nvPr>
-            <p:ph type="ftr" sz="quarter" idx="3"/>
-          </p:nvPr>
-        </p:nvSpPr>
-        <p:spPr>
-          <a:xfrm>
-            <a:off x="3028950" y="6356353"/>
-            <a:ext cx="3086100" cy="365125"/>
-          </a:xfrm>
-        </p:spPr>
-        <p:txBody>
-          <a:bodyPr/>
-          <a:lstStyle/>
-          <a:p>
-            <a:r>
-              <a:rPr lang="en-US" dirty="0"/>
-              <a:t>Kwartler CSCI 96</a:t>
-            </a:r>
-          </a:p>
-        </p:txBody>
-      </p:sp>
-    </p:spTree>
-    <p:extLst>
-      <p:ext uri="{BB962C8B-B14F-4D97-AF65-F5344CB8AC3E}">
-        <p14:creationId xmlns:p14="http://schemas.microsoft.com/office/powerpoint/2010/main" val="3492035173"/>
       </p:ext>
     </p:extLst>
   </p:cSld>
@@ -5514,16 +5488,21 @@
             <p:ph type="title"/>
           </p:nvPr>
         </p:nvSpPr>
-        <p:spPr/>
+        <p:spPr>
+          <a:xfrm>
+            <a:off x="209861" y="155268"/>
+            <a:ext cx="8649325" cy="591477"/>
+          </a:xfrm>
+        </p:spPr>
         <p:txBody>
           <a:bodyPr>
-            <a:normAutofit/>
+            <a:normAutofit fontScale="90000"/>
           </a:bodyPr>
           <a:lstStyle/>
           <a:p>
             <a:r>
               <a:rPr lang="en-US" dirty="0"/>
-              <a:t>Making a CAPM style plot</a:t>
+              <a:t>Making a CAPM style plot to understand risk/reward relationship &amp; optimize choice.</a:t>
             </a:r>
           </a:p>
         </p:txBody>
@@ -5545,7 +5524,7 @@
           <a:p>
             <a:fld id="{6700A58B-DD98-43D0-B791-721480A02982}" type="datetime1">
               <a:rPr lang="en-US" smtClean="0"/>
-              <a:t>11/22/21</a:t>
+              <a:t>4/4/22</a:t>
             </a:fld>
             <a:endParaRPr lang="en-US"/>
           </a:p>
@@ -5742,7 +5721,7 @@
           <a:p>
             <a:fld id="{6700A58B-DD98-43D0-B791-721480A02982}" type="datetime1">
               <a:rPr lang="en-US" smtClean="0"/>
-              <a:t>11/22/21</a:t>
+              <a:t>4/4/22</a:t>
             </a:fld>
             <a:endParaRPr lang="en-US"/>
           </a:p>
@@ -5930,7 +5909,7 @@
           <a:p>
             <a:fld id="{6700A58B-DD98-43D0-B791-721480A02982}" type="datetime1">
               <a:rPr lang="en-US" smtClean="0"/>
-              <a:t>11/22/21</a:t>
+              <a:t>4/4/22</a:t>
             </a:fld>
             <a:endParaRPr lang="en-US"/>
           </a:p>
@@ -6554,7 +6533,7 @@
           <a:p>
             <a:fld id="{9B19E99B-5349-415A-8E56-8E989211A366}" type="datetime1">
               <a:rPr lang="en-US" smtClean="0"/>
-              <a:t>11/22/21</a:t>
+              <a:t>4/4/22</a:t>
             </a:fld>
             <a:endParaRPr lang="en-US"/>
           </a:p>
@@ -6664,7 +6643,7 @@
           <a:p>
             <a:fld id="{6700A58B-DD98-43D0-B791-721480A02982}" type="datetime1">
               <a:rPr lang="en-US" smtClean="0"/>
-              <a:t>11/22/21</a:t>
+              <a:t>4/4/22</a:t>
             </a:fld>
             <a:endParaRPr lang="en-US"/>
           </a:p>
@@ -7150,7 +7129,7 @@
           <a:p>
             <a:fld id="{6700A58B-DD98-43D0-B791-721480A02982}" type="datetime1">
               <a:rPr lang="en-US" smtClean="0"/>
-              <a:t>11/22/21</a:t>
+              <a:t>4/4/22</a:t>
             </a:fld>
             <a:endParaRPr lang="en-US"/>
           </a:p>
@@ -7305,7 +7284,7 @@
           <a:p>
             <a:fld id="{6700A58B-DD98-43D0-B791-721480A02982}" type="datetime1">
               <a:rPr lang="en-US" smtClean="0"/>
-              <a:t>11/22/21</a:t>
+              <a:t>4/4/22</a:t>
             </a:fld>
             <a:endParaRPr lang="en-US"/>
           </a:p>
@@ -7526,7 +7505,7 @@
           <a:p>
             <a:fld id="{6700A58B-DD98-43D0-B791-721480A02982}" type="datetime1">
               <a:rPr lang="en-US" smtClean="0"/>
-              <a:t>11/22/21</a:t>
+              <a:t>4/4/22</a:t>
             </a:fld>
             <a:endParaRPr lang="en-US"/>
           </a:p>
@@ -7731,7 +7710,7 @@
           <a:p>
             <a:fld id="{6700A58B-DD98-43D0-B791-721480A02982}" type="datetime1">
               <a:rPr lang="en-US" smtClean="0"/>
-              <a:t>11/22/21</a:t>
+              <a:t>4/4/22</a:t>
             </a:fld>
             <a:endParaRPr lang="en-US"/>
           </a:p>
@@ -8078,7 +8057,7 @@
           <a:p>
             <a:fld id="{6700A58B-DD98-43D0-B791-721480A02982}" type="datetime1">
               <a:rPr lang="en-US" smtClean="0"/>
-              <a:t>11/22/21</a:t>
+              <a:t>4/4/22</a:t>
             </a:fld>
             <a:endParaRPr lang="en-US"/>
           </a:p>
@@ -8384,7 +8363,7 @@
           <a:p>
             <a:fld id="{6700A58B-DD98-43D0-B791-721480A02982}" type="datetime1">
               <a:rPr lang="en-US" smtClean="0"/>
-              <a:t>11/22/21</a:t>
+              <a:t>4/4/22</a:t>
             </a:fld>
             <a:endParaRPr lang="en-US"/>
           </a:p>
@@ -8743,7 +8722,7 @@
           <a:p>
             <a:fld id="{6700A58B-DD98-43D0-B791-721480A02982}" type="datetime1">
               <a:rPr lang="en-US" smtClean="0"/>
-              <a:t>11/22/21</a:t>
+              <a:t>4/4/22</a:t>
             </a:fld>
             <a:endParaRPr lang="en-US"/>
           </a:p>
@@ -9122,7 +9101,7 @@
           <a:p>
             <a:fld id="{6700A58B-DD98-43D0-B791-721480A02982}" type="datetime1">
               <a:rPr lang="en-US" smtClean="0"/>
-              <a:t>11/22/21</a:t>
+              <a:t>4/4/22</a:t>
             </a:fld>
             <a:endParaRPr lang="en-US"/>
           </a:p>
@@ -9302,7 +9281,7 @@
           <a:p>
             <a:fld id="{6700A58B-DD98-43D0-B791-721480A02982}" type="datetime1">
               <a:rPr lang="en-US" smtClean="0"/>
-              <a:t>11/22/21</a:t>
+              <a:t>4/4/22</a:t>
             </a:fld>
             <a:endParaRPr lang="en-US"/>
           </a:p>
@@ -9317,7 +9296,7 @@
         <p:spPr>
           <a:xfrm>
             <a:off x="4714433" y="2394178"/>
-            <a:ext cx="3487034" cy="2585323"/>
+            <a:ext cx="3487034" cy="2862322"/>
           </a:xfrm>
           <a:prstGeom prst="rect">
             <a:avLst/>
@@ -9387,8 +9366,13 @@
             </a:pPr>
             <a:r>
               <a:rPr lang="en-US" dirty="0"/>
-              <a:t>1 in 6 packs will have a random premium foil card replacing a common. </a:t>
-            </a:r>
+              <a:t>1 in 6 packs will have a random premium foil card replacing a common, uncommon, rare </a:t>
+            </a:r>
+            <a:r>
+              <a:rPr lang="en-US"/>
+              <a:t>or mythic. </a:t>
+            </a:r>
+            <a:endParaRPr lang="en-US" dirty="0"/>
           </a:p>
         </p:txBody>
       </p:sp>
@@ -9513,7 +9497,7 @@
           <a:p>
             <a:fld id="{6700A58B-DD98-43D0-B791-721480A02982}" type="datetime1">
               <a:rPr lang="en-US" smtClean="0"/>
-              <a:t>11/22/21</a:t>
+              <a:t>4/4/22</a:t>
             </a:fld>
             <a:endParaRPr lang="en-US"/>
           </a:p>
@@ -10222,7 +10206,7 @@
           <a:p>
             <a:fld id="{9B19E99B-5349-415A-8E56-8E989211A366}" type="datetime1">
               <a:rPr lang="en-US" smtClean="0"/>
-              <a:t>11/22/21</a:t>
+              <a:t>4/4/22</a:t>
             </a:fld>
             <a:endParaRPr lang="en-US"/>
           </a:p>
@@ -10375,7 +10359,7 @@
           <a:p>
             <a:fld id="{D753EFC8-4232-4598-94F6-94C0EBAFC469}" type="datetime1">
               <a:rPr lang="en-US" smtClean="0"/>
-              <a:t>11/22/21</a:t>
+              <a:t>4/4/22</a:t>
             </a:fld>
             <a:endParaRPr lang="en-US"/>
           </a:p>
@@ -10898,7 +10882,7 @@
           <a:p>
             <a:fld id="{6700A58B-DD98-43D0-B791-721480A02982}" type="datetime1">
               <a:rPr lang="en-US" smtClean="0"/>
-              <a:t>11/22/21</a:t>
+              <a:t>4/4/22</a:t>
             </a:fld>
             <a:endParaRPr lang="en-US"/>
           </a:p>
@@ -11085,7 +11069,7 @@
           <a:p>
             <a:fld id="{6700A58B-DD98-43D0-B791-721480A02982}" type="datetime1">
               <a:rPr lang="en-US" smtClean="0"/>
-              <a:t>11/22/21</a:t>
+              <a:t>4/4/22</a:t>
             </a:fld>
             <a:endParaRPr lang="en-US"/>
           </a:p>
@@ -11883,7 +11867,7 @@
           <a:p>
             <a:fld id="{6700A58B-DD98-43D0-B791-721480A02982}" type="datetime1">
               <a:rPr lang="en-US" smtClean="0"/>
-              <a:t>11/22/21</a:t>
+              <a:t>4/4/22</a:t>
             </a:fld>
             <a:endParaRPr lang="en-US"/>
           </a:p>
@@ -12694,7 +12678,7 @@
           <a:p>
             <a:fld id="{6700A58B-DD98-43D0-B791-721480A02982}" type="datetime1">
               <a:rPr lang="en-US" smtClean="0"/>
-              <a:t>11/22/21</a:t>
+              <a:t>4/4/22</a:t>
             </a:fld>
             <a:endParaRPr lang="en-US"/>
           </a:p>
@@ -13014,7 +12998,7 @@
           <a:p>
             <a:fld id="{6700A58B-DD98-43D0-B791-721480A02982}" type="datetime1">
               <a:rPr lang="en-US" smtClean="0"/>
-              <a:t>11/22/21</a:t>
+              <a:t>4/4/22</a:t>
             </a:fld>
             <a:endParaRPr lang="en-US"/>
           </a:p>
@@ -14160,7 +14144,7 @@
           <a:p>
             <a:fld id="{6700A58B-DD98-43D0-B791-721480A02982}" type="datetime1">
               <a:rPr lang="en-US" smtClean="0"/>
-              <a:t>11/22/21</a:t>
+              <a:t>4/4/22</a:t>
             </a:fld>
             <a:endParaRPr lang="en-US"/>
           </a:p>
@@ -15376,7 +15360,7 @@
           <a:p>
             <a:fld id="{6700A58B-DD98-43D0-B791-721480A02982}" type="datetime1">
               <a:rPr lang="en-US" smtClean="0"/>
-              <a:t>11/22/21</a:t>
+              <a:t>4/4/22</a:t>
             </a:fld>
             <a:endParaRPr lang="en-US"/>
           </a:p>
@@ -15536,13 +15520,8 @@
           <a:p>
             <a:r>
               <a:rPr lang="en-US" dirty="0"/>
-              <a:t>Open </a:t>
-            </a:r>
-            <a:r>
-              <a:rPr lang="en-US" dirty="0" err="1"/>
-              <a:t>A_ConsumerCreditTraining.R</a:t>
-            </a:r>
-            <a:endParaRPr lang="en-US" dirty="0"/>
+              <a:t>Cutoff Threshold</a:t>
+            </a:r>
           </a:p>
         </p:txBody>
       </p:sp>
@@ -15563,7 +15542,7 @@
           <a:p>
             <a:fld id="{6700A58B-DD98-43D0-B791-721480A02982}" type="datetime1">
               <a:rPr lang="en-US" smtClean="0"/>
-              <a:t>11/22/21</a:t>
+              <a:t>4/4/22</a:t>
             </a:fld>
             <a:endParaRPr lang="en-US"/>
           </a:p>
@@ -15571,14 +15550,14 @@
       </p:sp>
       <p:sp>
         <p:nvSpPr>
-          <p:cNvPr id="7" name="TextBox 6"/>
+          <p:cNvPr id="6" name="TextBox 5"/>
           <p:cNvSpPr txBox="1"/>
           <p:nvPr/>
         </p:nvSpPr>
         <p:spPr>
           <a:xfrm>
-            <a:off x="1671638" y="2100265"/>
-            <a:ext cx="4005712" cy="1246495"/>
+            <a:off x="658816" y="3071213"/>
+            <a:ext cx="7872155" cy="1061829"/>
           </a:xfrm>
           <a:prstGeom prst="rect">
             <a:avLst/>
@@ -15591,59 +15570,90 @@
           </a:bodyPr>
           <a:lstStyle/>
           <a:p>
-            <a:r>
-              <a:rPr lang="en-US" sz="2100" u="sng" dirty="0"/>
-              <a:t>Learning Objective:</a:t>
-            </a:r>
-          </a:p>
-          <a:p>
-            <a:pPr marL="214313" indent="-214313">
+            <a:pPr marL="82154" indent="-82154">
               <a:buFont typeface="Arial" panose="020B0604020202020204" pitchFamily="34" charset="0"/>
               <a:buChar char="•"/>
             </a:pPr>
             <a:r>
-              <a:rPr lang="en-US" sz="1350" dirty="0"/>
-              <a:t>Load in real lending club data</a:t>
-            </a:r>
-          </a:p>
-          <a:p>
-            <a:pPr marL="214313" indent="-214313">
+              <a:rPr lang="en-US" sz="2100" dirty="0"/>
+              <a:t>Should we be equal weighted?  </a:t>
+            </a:r>
+          </a:p>
+          <a:p>
+            <a:pPr marL="82154" indent="-82154">
               <a:buFont typeface="Arial" panose="020B0604020202020204" pitchFamily="34" charset="0"/>
               <a:buChar char="•"/>
             </a:pPr>
-            <a:r>
-              <a:rPr lang="en-US" sz="1350" dirty="0"/>
-              <a:t>Treat the variables for modeling</a:t>
-            </a:r>
-          </a:p>
-          <a:p>
-            <a:pPr marL="214313" indent="-214313">
+            <a:endParaRPr lang="en-US" sz="2100" dirty="0"/>
+          </a:p>
+          <a:p>
+            <a:pPr marL="82154" indent="-82154">
               <a:buFont typeface="Arial" panose="020B0604020202020204" pitchFamily="34" charset="0"/>
               <a:buChar char="•"/>
             </a:pPr>
             <a:r>
-              <a:rPr lang="en-US" sz="1350" dirty="0"/>
-              <a:t>Build a cross validated logistic regression with caret</a:t>
-            </a:r>
-          </a:p>
-          <a:p>
-            <a:pPr marL="214313" indent="-214313">
-              <a:buFont typeface="Arial" panose="020B0604020202020204" pitchFamily="34" charset="0"/>
-              <a:buChar char="•"/>
-            </a:pPr>
-            <a:r>
-              <a:rPr lang="en-US" sz="1350" dirty="0"/>
-              <a:t>Save model object &amp; variable treatment plan</a:t>
-            </a:r>
-          </a:p>
-        </p:txBody>
-      </p:sp>
-      <p:sp>
-        <p:nvSpPr>
-          <p:cNvPr id="9" name="Footer Placeholder 5">
+              <a:rPr lang="en-US" sz="2100" dirty="0"/>
+              <a:t>Do we care </a:t>
+            </a:r>
+            <a:r>
+              <a:rPr lang="en-US" sz="2100" u="sng" dirty="0"/>
+              <a:t>equally</a:t>
+            </a:r>
+            <a:r>
+              <a:rPr lang="en-US" sz="2100" dirty="0"/>
+              <a:t> about picking paying notes and charged off loans?</a:t>
+            </a:r>
+          </a:p>
+        </p:txBody>
+      </p:sp>
+      <p:sp>
+        <p:nvSpPr>
+          <p:cNvPr id="9" name="TextBox 8">
             <a:extLst>
               <a:ext uri="{FF2B5EF4-FFF2-40B4-BE49-F238E27FC236}">
-                <a16:creationId xmlns:a16="http://schemas.microsoft.com/office/drawing/2014/main" id="{9277C6F8-4983-274A-964F-2EF190F05F15}"/>
+                <a16:creationId xmlns:a16="http://schemas.microsoft.com/office/drawing/2014/main" id="{6F8E5C01-2AE6-489C-BED6-17BC74CB7B2E}"/>
+              </a:ext>
+            </a:extLst>
+          </p:cNvPr>
+          <p:cNvSpPr txBox="1"/>
+          <p:nvPr/>
+        </p:nvSpPr>
+        <p:spPr>
+          <a:xfrm>
+            <a:off x="150185" y="1832368"/>
+            <a:ext cx="8843630" cy="300082"/>
+          </a:xfrm>
+          <a:prstGeom prst="rect">
+            <a:avLst/>
+          </a:prstGeom>
+          <a:solidFill>
+            <a:schemeClr val="accent2"/>
+          </a:solidFill>
+        </p:spPr>
+        <p:txBody>
+          <a:bodyPr wrap="square" rtlCol="0">
+            <a:spAutoFit/>
+          </a:bodyPr>
+          <a:lstStyle/>
+          <a:p>
+            <a:pPr algn="ctr"/>
+            <a:r>
+              <a:rPr lang="en-US" sz="1350" dirty="0">
+                <a:solidFill>
+                  <a:schemeClr val="bg1"/>
+                </a:solidFill>
+              </a:rPr>
+              <a:t>Is 0.50 the optimal cutoff?</a:t>
+            </a:r>
+          </a:p>
+        </p:txBody>
+      </p:sp>
+      <p:sp>
+        <p:nvSpPr>
+          <p:cNvPr id="10" name="Footer Placeholder 5">
+            <a:extLst>
+              <a:ext uri="{FF2B5EF4-FFF2-40B4-BE49-F238E27FC236}">
+                <a16:creationId xmlns:a16="http://schemas.microsoft.com/office/drawing/2014/main" id="{F4436ACB-9FF7-F648-8297-D3665261015D}"/>
               </a:ext>
             </a:extLst>
           </p:cNvPr>
@@ -15674,7 +15684,7 @@
     </p:spTree>
     <p:extLst>
       <p:ext uri="{BB962C8B-B14F-4D97-AF65-F5344CB8AC3E}">
-        <p14:creationId xmlns:p14="http://schemas.microsoft.com/office/powerpoint/2010/main" val="1623617834"/>
+        <p14:creationId xmlns:p14="http://schemas.microsoft.com/office/powerpoint/2010/main" val="3492035173"/>
       </p:ext>
     </p:extLst>
   </p:cSld>

</xml_diff>